<commit_message>
Adding file Tutoriel.pptx via upload
</commit_message>
<xml_diff>
--- a/Tutoriel.pptx
+++ b/Tutoriel.pptx
@@ -117,6 +117,11 @@
       </a:defRPr>
     </a:lvl9pPr>
   </p:defaultTextStyle>
+  <p:extLst>
+    <p:ext uri="{EFAFB233-063F-42B5-8137-9DF3F51BA10A}">
+      <p15:sldGuideLst xmlns:p15="http://schemas.microsoft.com/office/powerpoint/2012/main"/>
+    </p:ext>
+  </p:extLst>
 </p:presentation>
 </file>
 
@@ -251,7 +256,7 @@
           <a:p>
             <a:fld id="{2598FF8E-43CC-4EE6-AD3B-BACC906C2BC8}" type="datetimeFigureOut">
               <a:rPr lang="en-US" smtClean="0"/>
-              <a:t>1/3/2018</a:t>
+              <a:t>2/11/2018</a:t>
             </a:fld>
             <a:endParaRPr lang="en-US"/>
           </a:p>
@@ -421,7 +426,7 @@
           <a:p>
             <a:fld id="{2598FF8E-43CC-4EE6-AD3B-BACC906C2BC8}" type="datetimeFigureOut">
               <a:rPr lang="en-US" smtClean="0"/>
-              <a:t>1/3/2018</a:t>
+              <a:t>2/11/2018</a:t>
             </a:fld>
             <a:endParaRPr lang="en-US"/>
           </a:p>
@@ -601,7 +606,7 @@
           <a:p>
             <a:fld id="{2598FF8E-43CC-4EE6-AD3B-BACC906C2BC8}" type="datetimeFigureOut">
               <a:rPr lang="en-US" smtClean="0"/>
-              <a:t>1/3/2018</a:t>
+              <a:t>2/11/2018</a:t>
             </a:fld>
             <a:endParaRPr lang="en-US"/>
           </a:p>
@@ -771,7 +776,7 @@
           <a:p>
             <a:fld id="{2598FF8E-43CC-4EE6-AD3B-BACC906C2BC8}" type="datetimeFigureOut">
               <a:rPr lang="en-US" smtClean="0"/>
-              <a:t>1/3/2018</a:t>
+              <a:t>2/11/2018</a:t>
             </a:fld>
             <a:endParaRPr lang="en-US"/>
           </a:p>
@@ -1017,7 +1022,7 @@
           <a:p>
             <a:fld id="{2598FF8E-43CC-4EE6-AD3B-BACC906C2BC8}" type="datetimeFigureOut">
               <a:rPr lang="en-US" smtClean="0"/>
-              <a:t>1/3/2018</a:t>
+              <a:t>2/11/2018</a:t>
             </a:fld>
             <a:endParaRPr lang="en-US"/>
           </a:p>
@@ -1249,7 +1254,7 @@
           <a:p>
             <a:fld id="{2598FF8E-43CC-4EE6-AD3B-BACC906C2BC8}" type="datetimeFigureOut">
               <a:rPr lang="en-US" smtClean="0"/>
-              <a:t>1/3/2018</a:t>
+              <a:t>2/11/2018</a:t>
             </a:fld>
             <a:endParaRPr lang="en-US"/>
           </a:p>
@@ -1616,7 +1621,7 @@
           <a:p>
             <a:fld id="{2598FF8E-43CC-4EE6-AD3B-BACC906C2BC8}" type="datetimeFigureOut">
               <a:rPr lang="en-US" smtClean="0"/>
-              <a:t>1/3/2018</a:t>
+              <a:t>2/11/2018</a:t>
             </a:fld>
             <a:endParaRPr lang="en-US"/>
           </a:p>
@@ -1734,7 +1739,7 @@
           <a:p>
             <a:fld id="{2598FF8E-43CC-4EE6-AD3B-BACC906C2BC8}" type="datetimeFigureOut">
               <a:rPr lang="en-US" smtClean="0"/>
-              <a:t>1/3/2018</a:t>
+              <a:t>2/11/2018</a:t>
             </a:fld>
             <a:endParaRPr lang="en-US"/>
           </a:p>
@@ -1829,7 +1834,7 @@
           <a:p>
             <a:fld id="{2598FF8E-43CC-4EE6-AD3B-BACC906C2BC8}" type="datetimeFigureOut">
               <a:rPr lang="en-US" smtClean="0"/>
-              <a:t>1/3/2018</a:t>
+              <a:t>2/11/2018</a:t>
             </a:fld>
             <a:endParaRPr lang="en-US"/>
           </a:p>
@@ -2106,7 +2111,7 @@
           <a:p>
             <a:fld id="{2598FF8E-43CC-4EE6-AD3B-BACC906C2BC8}" type="datetimeFigureOut">
               <a:rPr lang="en-US" smtClean="0"/>
-              <a:t>1/3/2018</a:t>
+              <a:t>2/11/2018</a:t>
             </a:fld>
             <a:endParaRPr lang="en-US"/>
           </a:p>
@@ -2359,7 +2364,7 @@
           <a:p>
             <a:fld id="{2598FF8E-43CC-4EE6-AD3B-BACC906C2BC8}" type="datetimeFigureOut">
               <a:rPr lang="en-US" smtClean="0"/>
-              <a:t>1/3/2018</a:t>
+              <a:t>2/11/2018</a:t>
             </a:fld>
             <a:endParaRPr lang="en-US"/>
           </a:p>
@@ -2572,7 +2577,7 @@
           <a:p>
             <a:fld id="{2598FF8E-43CC-4EE6-AD3B-BACC906C2BC8}" type="datetimeFigureOut">
               <a:rPr lang="en-US" smtClean="0"/>
-              <a:t>1/3/2018</a:t>
+              <a:t>2/11/2018</a:t>
             </a:fld>
             <a:endParaRPr lang="en-US"/>
           </a:p>
@@ -3109,7 +3114,19 @@
           <a:p>
             <a:r>
               <a:rPr lang="en-US" dirty="0" smtClean="0"/>
-              <a:t>Faire pull du depot avec : </a:t>
+              <a:t>Faire pull du </a:t>
+            </a:r>
+            <a:r>
+              <a:rPr lang="fr-FR" dirty="0" smtClean="0"/>
+              <a:t>dépôt</a:t>
+            </a:r>
+            <a:r>
+              <a:rPr lang="en-US" dirty="0" smtClean="0"/>
+              <a:t> </a:t>
+            </a:r>
+            <a:r>
+              <a:rPr lang="en-US" dirty="0" smtClean="0"/>
+              <a:t>avec : </a:t>
             </a:r>
             <a:r>
               <a:rPr lang="en-US" dirty="0" err="1" smtClean="0"/>
@@ -3448,7 +3465,7 @@
             </a:r>
             <a:r>
               <a:rPr lang="en-US" i="1" dirty="0" smtClean="0"/>
-              <a:t> run /hello-world</a:t>
+              <a:t> run hello-world</a:t>
             </a:r>
           </a:p>
           <a:p>
@@ -3731,7 +3748,6 @@
               <a:rPr lang="fr-FR" b="1" dirty="0" smtClean="0"/>
               <a:t>Exigences</a:t>
             </a:r>
-            <a:endParaRPr lang="fr-FR" b="1" dirty="0" smtClean="0"/>
           </a:p>
         </p:txBody>
       </p:sp>
@@ -4519,15 +4535,7 @@
           <a:p>
             <a:r>
               <a:rPr lang="fr-FR" dirty="0" smtClean="0"/>
-              <a:t>Une fois que vous vous êtes inscrit et que vous avez créé un </a:t>
-            </a:r>
-            <a:r>
-              <a:rPr lang="fr-FR" dirty="0" smtClean="0"/>
-              <a:t>dépôt </a:t>
-            </a:r>
-            <a:r>
-              <a:rPr lang="fr-FR" dirty="0" smtClean="0"/>
-              <a:t>, accédez à la ligne de commande et connectez-vous avec: </a:t>
+              <a:t>Une fois que vous vous êtes inscrit et que vous avez créé un dépôt , accédez à la ligne de commande et connectez-vous avec: </a:t>
             </a:r>
             <a:r>
               <a:rPr lang="fr-FR" i="1" dirty="0" smtClean="0"/>

</xml_diff>